<commit_message>
Megcsináltam a szerver bemutatót.
</commit_message>
<xml_diff>
--- a/Szerver bemutató.pptx
+++ b/Szerver bemutató.pptx
@@ -113,6 +113,11 @@
       </a:defRPr>
     </a:lvl9pPr>
   </p:defaultTextStyle>
+  <p:extLst>
+    <p:ext uri="{EFAFB233-063F-42B5-8137-9DF3F51BA10A}">
+      <p15:sldGuideLst xmlns:p15="http://schemas.microsoft.com/office/powerpoint/2012/main"/>
+    </p:ext>
+  </p:extLst>
 </p:presentation>
 </file>
 
@@ -3474,13 +3479,13 @@
   <p:clrMapOvr>
     <a:masterClrMapping/>
   </p:clrMapOvr>
-  <mc:AlternateContent xmlns:mc="http://schemas.openxmlformats.org/markup-compatibility/2006">
-    <mc:Choice xmlns:p14="http://schemas.microsoft.com/office/powerpoint/2010/main" Requires="p14">
+  <mc:AlternateContent xmlns:mc="http://schemas.openxmlformats.org/markup-compatibility/2006" xmlns:p14="http://schemas.microsoft.com/office/powerpoint/2010/main">
+    <mc:Choice Requires="p14">
       <p:transition spd="slow" p14:dur="1600">
         <p:blinds dir="vert"/>
       </p:transition>
     </mc:Choice>
-    <mc:Fallback>
+    <mc:Fallback xmlns="">
       <p:transition spd="slow">
         <p:blinds dir="vert"/>
       </p:transition>
@@ -3790,9 +3795,390 @@
   <p:clrMapOvr>
     <a:masterClrMapping/>
   </p:clrMapOvr>
-  <p:transition spd="slow">
-    <p:cover/>
-  </p:transition>
+  <mc:AlternateContent xmlns:mc="http://schemas.openxmlformats.org/markup-compatibility/2006">
+    <mc:Choice xmlns:p14="http://schemas.microsoft.com/office/powerpoint/2010/main" Requires="p14">
+      <p:transition spd="slow" p14:dur="1600">
+        <p:blinds dir="vert"/>
+      </p:transition>
+    </mc:Choice>
+    <mc:Fallback>
+      <p:transition spd="slow">
+        <p:blinds dir="vert"/>
+      </p:transition>
+    </mc:Fallback>
+  </mc:AlternateContent>
+  <p:timing>
+    <p:tnLst>
+      <p:par>
+        <p:cTn id="1" dur="indefinite" restart="never" nodeType="tmRoot">
+          <p:childTnLst>
+            <p:seq concurrent="1" nextAc="seek">
+              <p:cTn id="2" dur="indefinite" nodeType="mainSeq">
+                <p:childTnLst>
+                  <p:par>
+                    <p:cTn id="3" fill="hold">
+                      <p:stCondLst>
+                        <p:cond delay="indefinite"/>
+                        <p:cond evt="onBegin" delay="0">
+                          <p:tn val="2"/>
+                        </p:cond>
+                      </p:stCondLst>
+                      <p:childTnLst>
+                        <p:par>
+                          <p:cTn id="4" fill="hold">
+                            <p:stCondLst>
+                              <p:cond delay="0"/>
+                            </p:stCondLst>
+                            <p:childTnLst>
+                              <p:par>
+                                <p:cTn id="5" presetID="47" presetClass="entr" presetSubtype="0" fill="hold" grpId="0" nodeType="afterEffect">
+                                  <p:stCondLst>
+                                    <p:cond delay="0"/>
+                                  </p:stCondLst>
+                                  <p:childTnLst>
+                                    <p:set>
+                                      <p:cBhvr>
+                                        <p:cTn id="6" dur="1" fill="hold">
+                                          <p:stCondLst>
+                                            <p:cond delay="0"/>
+                                          </p:stCondLst>
+                                        </p:cTn>
+                                        <p:tgtEl>
+                                          <p:spTgt spid="6"/>
+                                        </p:tgtEl>
+                                        <p:attrNameLst>
+                                          <p:attrName>style.visibility</p:attrName>
+                                        </p:attrNameLst>
+                                      </p:cBhvr>
+                                      <p:to>
+                                        <p:strVal val="visible"/>
+                                      </p:to>
+                                    </p:set>
+                                    <p:animEffect transition="in" filter="fade">
+                                      <p:cBhvr>
+                                        <p:cTn id="7" dur="1000"/>
+                                        <p:tgtEl>
+                                          <p:spTgt spid="6"/>
+                                        </p:tgtEl>
+                                      </p:cBhvr>
+                                    </p:animEffect>
+                                    <p:anim calcmode="lin" valueType="num">
+                                      <p:cBhvr>
+                                        <p:cTn id="8" dur="1000" fill="hold"/>
+                                        <p:tgtEl>
+                                          <p:spTgt spid="6"/>
+                                        </p:tgtEl>
+                                        <p:attrNameLst>
+                                          <p:attrName>ppt_x</p:attrName>
+                                        </p:attrNameLst>
+                                      </p:cBhvr>
+                                      <p:tavLst>
+                                        <p:tav tm="0">
+                                          <p:val>
+                                            <p:strVal val="#ppt_x"/>
+                                          </p:val>
+                                        </p:tav>
+                                        <p:tav tm="100000">
+                                          <p:val>
+                                            <p:strVal val="#ppt_x"/>
+                                          </p:val>
+                                        </p:tav>
+                                      </p:tavLst>
+                                    </p:anim>
+                                    <p:anim calcmode="lin" valueType="num">
+                                      <p:cBhvr>
+                                        <p:cTn id="9" dur="1000" fill="hold"/>
+                                        <p:tgtEl>
+                                          <p:spTgt spid="6"/>
+                                        </p:tgtEl>
+                                        <p:attrNameLst>
+                                          <p:attrName>ppt_y</p:attrName>
+                                        </p:attrNameLst>
+                                      </p:cBhvr>
+                                      <p:tavLst>
+                                        <p:tav tm="0">
+                                          <p:val>
+                                            <p:strVal val="#ppt_y-.1"/>
+                                          </p:val>
+                                        </p:tav>
+                                        <p:tav tm="100000">
+                                          <p:val>
+                                            <p:strVal val="#ppt_y"/>
+                                          </p:val>
+                                        </p:tav>
+                                      </p:tavLst>
+                                    </p:anim>
+                                  </p:childTnLst>
+                                </p:cTn>
+                              </p:par>
+                              <p:par>
+                                <p:cTn id="10" presetID="47" presetClass="entr" presetSubtype="0" fill="hold" grpId="0" nodeType="withEffect">
+                                  <p:stCondLst>
+                                    <p:cond delay="0"/>
+                                  </p:stCondLst>
+                                  <p:childTnLst>
+                                    <p:set>
+                                      <p:cBhvr>
+                                        <p:cTn id="11" dur="1" fill="hold">
+                                          <p:stCondLst>
+                                            <p:cond delay="0"/>
+                                          </p:stCondLst>
+                                        </p:cTn>
+                                        <p:tgtEl>
+                                          <p:spTgt spid="7"/>
+                                        </p:tgtEl>
+                                        <p:attrNameLst>
+                                          <p:attrName>style.visibility</p:attrName>
+                                        </p:attrNameLst>
+                                      </p:cBhvr>
+                                      <p:to>
+                                        <p:strVal val="visible"/>
+                                      </p:to>
+                                    </p:set>
+                                    <p:animEffect transition="in" filter="fade">
+                                      <p:cBhvr>
+                                        <p:cTn id="12" dur="1000"/>
+                                        <p:tgtEl>
+                                          <p:spTgt spid="7"/>
+                                        </p:tgtEl>
+                                      </p:cBhvr>
+                                    </p:animEffect>
+                                    <p:anim calcmode="lin" valueType="num">
+                                      <p:cBhvr>
+                                        <p:cTn id="13" dur="1000" fill="hold"/>
+                                        <p:tgtEl>
+                                          <p:spTgt spid="7"/>
+                                        </p:tgtEl>
+                                        <p:attrNameLst>
+                                          <p:attrName>ppt_x</p:attrName>
+                                        </p:attrNameLst>
+                                      </p:cBhvr>
+                                      <p:tavLst>
+                                        <p:tav tm="0">
+                                          <p:val>
+                                            <p:strVal val="#ppt_x"/>
+                                          </p:val>
+                                        </p:tav>
+                                        <p:tav tm="100000">
+                                          <p:val>
+                                            <p:strVal val="#ppt_x"/>
+                                          </p:val>
+                                        </p:tav>
+                                      </p:tavLst>
+                                    </p:anim>
+                                    <p:anim calcmode="lin" valueType="num">
+                                      <p:cBhvr>
+                                        <p:cTn id="14" dur="1000" fill="hold"/>
+                                        <p:tgtEl>
+                                          <p:spTgt spid="7"/>
+                                        </p:tgtEl>
+                                        <p:attrNameLst>
+                                          <p:attrName>ppt_y</p:attrName>
+                                        </p:attrNameLst>
+                                      </p:cBhvr>
+                                      <p:tavLst>
+                                        <p:tav tm="0">
+                                          <p:val>
+                                            <p:strVal val="#ppt_y-.1"/>
+                                          </p:val>
+                                        </p:tav>
+                                        <p:tav tm="100000">
+                                          <p:val>
+                                            <p:strVal val="#ppt_y"/>
+                                          </p:val>
+                                        </p:tav>
+                                      </p:tavLst>
+                                    </p:anim>
+                                  </p:childTnLst>
+                                </p:cTn>
+                              </p:par>
+                            </p:childTnLst>
+                          </p:cTn>
+                        </p:par>
+                        <p:par>
+                          <p:cTn id="15" fill="hold">
+                            <p:stCondLst>
+                              <p:cond delay="1000"/>
+                            </p:stCondLst>
+                            <p:childTnLst>
+                              <p:par>
+                                <p:cTn id="16" presetID="2" presetClass="entr" presetSubtype="8" fill="hold" nodeType="afterEffect">
+                                  <p:stCondLst>
+                                    <p:cond delay="0"/>
+                                  </p:stCondLst>
+                                  <p:childTnLst>
+                                    <p:set>
+                                      <p:cBhvr>
+                                        <p:cTn id="17" dur="1" fill="hold">
+                                          <p:stCondLst>
+                                            <p:cond delay="0"/>
+                                          </p:stCondLst>
+                                        </p:cTn>
+                                        <p:tgtEl>
+                                          <p:spTgt spid="3"/>
+                                        </p:tgtEl>
+                                        <p:attrNameLst>
+                                          <p:attrName>style.visibility</p:attrName>
+                                        </p:attrNameLst>
+                                      </p:cBhvr>
+                                      <p:to>
+                                        <p:strVal val="visible"/>
+                                      </p:to>
+                                    </p:set>
+                                    <p:anim calcmode="lin" valueType="num">
+                                      <p:cBhvr additive="base">
+                                        <p:cTn id="18" dur="1000" fill="hold"/>
+                                        <p:tgtEl>
+                                          <p:spTgt spid="3"/>
+                                        </p:tgtEl>
+                                        <p:attrNameLst>
+                                          <p:attrName>ppt_x</p:attrName>
+                                        </p:attrNameLst>
+                                      </p:cBhvr>
+                                      <p:tavLst>
+                                        <p:tav tm="0">
+                                          <p:val>
+                                            <p:strVal val="0-#ppt_w/2"/>
+                                          </p:val>
+                                        </p:tav>
+                                        <p:tav tm="100000">
+                                          <p:val>
+                                            <p:strVal val="#ppt_x"/>
+                                          </p:val>
+                                        </p:tav>
+                                      </p:tavLst>
+                                    </p:anim>
+                                    <p:anim calcmode="lin" valueType="num">
+                                      <p:cBhvr additive="base">
+                                        <p:cTn id="19" dur="1000" fill="hold"/>
+                                        <p:tgtEl>
+                                          <p:spTgt spid="3"/>
+                                        </p:tgtEl>
+                                        <p:attrNameLst>
+                                          <p:attrName>ppt_y</p:attrName>
+                                        </p:attrNameLst>
+                                      </p:cBhvr>
+                                      <p:tavLst>
+                                        <p:tav tm="0">
+                                          <p:val>
+                                            <p:strVal val="#ppt_y"/>
+                                          </p:val>
+                                        </p:tav>
+                                        <p:tav tm="100000">
+                                          <p:val>
+                                            <p:strVal val="#ppt_y"/>
+                                          </p:val>
+                                        </p:tav>
+                                      </p:tavLst>
+                                    </p:anim>
+                                  </p:childTnLst>
+                                </p:cTn>
+                              </p:par>
+                              <p:par>
+                                <p:cTn id="20" presetID="2" presetClass="entr" presetSubtype="2" fill="hold" nodeType="withEffect">
+                                  <p:stCondLst>
+                                    <p:cond delay="0"/>
+                                  </p:stCondLst>
+                                  <p:childTnLst>
+                                    <p:set>
+                                      <p:cBhvr>
+                                        <p:cTn id="21" dur="1" fill="hold">
+                                          <p:stCondLst>
+                                            <p:cond delay="0"/>
+                                          </p:stCondLst>
+                                        </p:cTn>
+                                        <p:tgtEl>
+                                          <p:spTgt spid="5"/>
+                                        </p:tgtEl>
+                                        <p:attrNameLst>
+                                          <p:attrName>style.visibility</p:attrName>
+                                        </p:attrNameLst>
+                                      </p:cBhvr>
+                                      <p:to>
+                                        <p:strVal val="visible"/>
+                                      </p:to>
+                                    </p:set>
+                                    <p:anim calcmode="lin" valueType="num">
+                                      <p:cBhvr additive="base">
+                                        <p:cTn id="22" dur="1000" fill="hold"/>
+                                        <p:tgtEl>
+                                          <p:spTgt spid="5"/>
+                                        </p:tgtEl>
+                                        <p:attrNameLst>
+                                          <p:attrName>ppt_x</p:attrName>
+                                        </p:attrNameLst>
+                                      </p:cBhvr>
+                                      <p:tavLst>
+                                        <p:tav tm="0">
+                                          <p:val>
+                                            <p:strVal val="1+#ppt_w/2"/>
+                                          </p:val>
+                                        </p:tav>
+                                        <p:tav tm="100000">
+                                          <p:val>
+                                            <p:strVal val="#ppt_x"/>
+                                          </p:val>
+                                        </p:tav>
+                                      </p:tavLst>
+                                    </p:anim>
+                                    <p:anim calcmode="lin" valueType="num">
+                                      <p:cBhvr additive="base">
+                                        <p:cTn id="23" dur="1000" fill="hold"/>
+                                        <p:tgtEl>
+                                          <p:spTgt spid="5"/>
+                                        </p:tgtEl>
+                                        <p:attrNameLst>
+                                          <p:attrName>ppt_y</p:attrName>
+                                        </p:attrNameLst>
+                                      </p:cBhvr>
+                                      <p:tavLst>
+                                        <p:tav tm="0">
+                                          <p:val>
+                                            <p:strVal val="#ppt_y"/>
+                                          </p:val>
+                                        </p:tav>
+                                        <p:tav tm="100000">
+                                          <p:val>
+                                            <p:strVal val="#ppt_y"/>
+                                          </p:val>
+                                        </p:tav>
+                                      </p:tavLst>
+                                    </p:anim>
+                                  </p:childTnLst>
+                                </p:cTn>
+                              </p:par>
+                            </p:childTnLst>
+                          </p:cTn>
+                        </p:par>
+                      </p:childTnLst>
+                    </p:cTn>
+                  </p:par>
+                </p:childTnLst>
+              </p:cTn>
+              <p:prevCondLst>
+                <p:cond evt="onPrev" delay="0">
+                  <p:tgtEl>
+                    <p:sldTgt/>
+                  </p:tgtEl>
+                </p:cond>
+              </p:prevCondLst>
+              <p:nextCondLst>
+                <p:cond evt="onNext" delay="0">
+                  <p:tgtEl>
+                    <p:sldTgt/>
+                  </p:tgtEl>
+                </p:cond>
+              </p:nextCondLst>
+            </p:seq>
+          </p:childTnLst>
+        </p:cTn>
+      </p:par>
+    </p:tnLst>
+    <p:bldLst>
+      <p:bldP spid="6" grpId="0"/>
+      <p:bldP spid="7" grpId="0"/>
+    </p:bldLst>
+  </p:timing>
 </p:sld>
 </file>
 
@@ -3827,8 +4213,8 @@
         </p:nvSpPr>
         <p:spPr>
           <a:xfrm>
-            <a:off x="3167269" y="2551837"/>
-            <a:ext cx="5857461" cy="1754326"/>
+            <a:off x="2650435" y="2551837"/>
+            <a:ext cx="7098476" cy="1754326"/>
           </a:xfrm>
           <a:prstGeom prst="rect">
             <a:avLst/>
@@ -3861,7 +4247,7 @@
               <a:rPr lang="hu-HU" dirty="0">
                 <a:effectLst/>
               </a:rPr>
-              <a:t>FTP/TFTP/NTP/MAIL szerver: Windows</a:t>
+              <a:t>FTP/TFTP/NTP/MAIL/SYSLOG szerver: Windows</a:t>
             </a:r>
           </a:p>
           <a:p>
@@ -3870,7 +4256,7 @@
                 <a:latin typeface="Times New Roman" panose="02020603050405020304" pitchFamily="18" charset="0"/>
                 <a:cs typeface="Times New Roman" panose="02020603050405020304" pitchFamily="18" charset="0"/>
               </a:rPr>
-              <a:t>	- DNS/DHCP/SYSLOG szerver: Linux</a:t>
+              <a:t>	- DNS/DHCP szerver: Linux</a:t>
             </a:r>
           </a:p>
           <a:p>
@@ -3888,7 +4274,7 @@
                 <a:latin typeface="Times New Roman" panose="02020603050405020304" pitchFamily="18" charset="0"/>
                 <a:cs typeface="Times New Roman" panose="02020603050405020304" pitchFamily="18" charset="0"/>
               </a:rPr>
-              <a:t>	- Tartalék FTP/TFTP/NTP/MAIL szerver: Windows</a:t>
+              <a:t>	- Tartalék FTP/TFTP/NTP/MAIL/SYSLOG  szerver: Windows</a:t>
             </a:r>
           </a:p>
           <a:p>
@@ -3897,7 +4283,7 @@
                 <a:latin typeface="Times New Roman" panose="02020603050405020304" pitchFamily="18" charset="0"/>
                 <a:cs typeface="Times New Roman" panose="02020603050405020304" pitchFamily="18" charset="0"/>
               </a:rPr>
-              <a:t>	- Tartalék DNS/DHCP/SYSLOG szerver: Linux</a:t>
+              <a:t>	- Tartalék DNS/DHCP szerver: Linux</a:t>
             </a:r>
           </a:p>
         </p:txBody>
@@ -6685,6 +7071,314 @@
   <p:transition spd="slow">
     <p:cover/>
   </p:transition>
+  <p:timing>
+    <p:tnLst>
+      <p:par>
+        <p:cTn id="1" dur="indefinite" restart="never" nodeType="tmRoot">
+          <p:childTnLst>
+            <p:seq concurrent="1" nextAc="seek">
+              <p:cTn id="2" dur="indefinite" nodeType="mainSeq">
+                <p:childTnLst>
+                  <p:par>
+                    <p:cTn id="3" fill="hold">
+                      <p:stCondLst>
+                        <p:cond delay="indefinite"/>
+                        <p:cond evt="onBegin" delay="0">
+                          <p:tn val="2"/>
+                        </p:cond>
+                      </p:stCondLst>
+                      <p:childTnLst>
+                        <p:par>
+                          <p:cTn id="4" fill="hold">
+                            <p:stCondLst>
+                              <p:cond delay="0"/>
+                            </p:stCondLst>
+                            <p:childTnLst>
+                              <p:par>
+                                <p:cTn id="5" presetID="47" presetClass="entr" presetSubtype="0" fill="hold" grpId="0" nodeType="afterEffect">
+                                  <p:stCondLst>
+                                    <p:cond delay="0"/>
+                                  </p:stCondLst>
+                                  <p:childTnLst>
+                                    <p:set>
+                                      <p:cBhvr>
+                                        <p:cTn id="6" dur="1" fill="hold">
+                                          <p:stCondLst>
+                                            <p:cond delay="0"/>
+                                          </p:stCondLst>
+                                        </p:cTn>
+                                        <p:tgtEl>
+                                          <p:spTgt spid="4"/>
+                                        </p:tgtEl>
+                                        <p:attrNameLst>
+                                          <p:attrName>style.visibility</p:attrName>
+                                        </p:attrNameLst>
+                                      </p:cBhvr>
+                                      <p:to>
+                                        <p:strVal val="visible"/>
+                                      </p:to>
+                                    </p:set>
+                                    <p:animEffect transition="in" filter="fade">
+                                      <p:cBhvr>
+                                        <p:cTn id="7" dur="1000"/>
+                                        <p:tgtEl>
+                                          <p:spTgt spid="4"/>
+                                        </p:tgtEl>
+                                      </p:cBhvr>
+                                    </p:animEffect>
+                                    <p:anim calcmode="lin" valueType="num">
+                                      <p:cBhvr>
+                                        <p:cTn id="8" dur="1000" fill="hold"/>
+                                        <p:tgtEl>
+                                          <p:spTgt spid="4"/>
+                                        </p:tgtEl>
+                                        <p:attrNameLst>
+                                          <p:attrName>ppt_x</p:attrName>
+                                        </p:attrNameLst>
+                                      </p:cBhvr>
+                                      <p:tavLst>
+                                        <p:tav tm="0">
+                                          <p:val>
+                                            <p:strVal val="#ppt_x"/>
+                                          </p:val>
+                                        </p:tav>
+                                        <p:tav tm="100000">
+                                          <p:val>
+                                            <p:strVal val="#ppt_x"/>
+                                          </p:val>
+                                        </p:tav>
+                                      </p:tavLst>
+                                    </p:anim>
+                                    <p:anim calcmode="lin" valueType="num">
+                                      <p:cBhvr>
+                                        <p:cTn id="9" dur="1000" fill="hold"/>
+                                        <p:tgtEl>
+                                          <p:spTgt spid="4"/>
+                                        </p:tgtEl>
+                                        <p:attrNameLst>
+                                          <p:attrName>ppt_y</p:attrName>
+                                        </p:attrNameLst>
+                                      </p:cBhvr>
+                                      <p:tavLst>
+                                        <p:tav tm="0">
+                                          <p:val>
+                                            <p:strVal val="#ppt_y-.1"/>
+                                          </p:val>
+                                        </p:tav>
+                                        <p:tav tm="100000">
+                                          <p:val>
+                                            <p:strVal val="#ppt_y"/>
+                                          </p:val>
+                                        </p:tav>
+                                      </p:tavLst>
+                                    </p:anim>
+                                  </p:childTnLst>
+                                </p:cTn>
+                              </p:par>
+                            </p:childTnLst>
+                          </p:cTn>
+                        </p:par>
+                        <p:par>
+                          <p:cTn id="10" fill="hold">
+                            <p:stCondLst>
+                              <p:cond delay="1000"/>
+                            </p:stCondLst>
+                            <p:childTnLst>
+                              <p:par>
+                                <p:cTn id="11" presetID="42" presetClass="entr" presetSubtype="0" fill="hold" grpId="0" nodeType="afterEffect">
+                                  <p:stCondLst>
+                                    <p:cond delay="0"/>
+                                  </p:stCondLst>
+                                  <p:childTnLst>
+                                    <p:set>
+                                      <p:cBhvr>
+                                        <p:cTn id="12" dur="1" fill="hold">
+                                          <p:stCondLst>
+                                            <p:cond delay="0"/>
+                                          </p:stCondLst>
+                                        </p:cTn>
+                                        <p:tgtEl>
+                                          <p:spTgt spid="5"/>
+                                        </p:tgtEl>
+                                        <p:attrNameLst>
+                                          <p:attrName>style.visibility</p:attrName>
+                                        </p:attrNameLst>
+                                      </p:cBhvr>
+                                      <p:to>
+                                        <p:strVal val="visible"/>
+                                      </p:to>
+                                    </p:set>
+                                    <p:animEffect transition="in" filter="fade">
+                                      <p:cBhvr>
+                                        <p:cTn id="13" dur="1000"/>
+                                        <p:tgtEl>
+                                          <p:spTgt spid="5"/>
+                                        </p:tgtEl>
+                                      </p:cBhvr>
+                                    </p:animEffect>
+                                    <p:anim calcmode="lin" valueType="num">
+                                      <p:cBhvr>
+                                        <p:cTn id="14" dur="1000" fill="hold"/>
+                                        <p:tgtEl>
+                                          <p:spTgt spid="5"/>
+                                        </p:tgtEl>
+                                        <p:attrNameLst>
+                                          <p:attrName>ppt_x</p:attrName>
+                                        </p:attrNameLst>
+                                      </p:cBhvr>
+                                      <p:tavLst>
+                                        <p:tav tm="0">
+                                          <p:val>
+                                            <p:strVal val="#ppt_x"/>
+                                          </p:val>
+                                        </p:tav>
+                                        <p:tav tm="100000">
+                                          <p:val>
+                                            <p:strVal val="#ppt_x"/>
+                                          </p:val>
+                                        </p:tav>
+                                      </p:tavLst>
+                                    </p:anim>
+                                    <p:anim calcmode="lin" valueType="num">
+                                      <p:cBhvr>
+                                        <p:cTn id="15" dur="1000" fill="hold"/>
+                                        <p:tgtEl>
+                                          <p:spTgt spid="5"/>
+                                        </p:tgtEl>
+                                        <p:attrNameLst>
+                                          <p:attrName>ppt_y</p:attrName>
+                                        </p:attrNameLst>
+                                      </p:cBhvr>
+                                      <p:tavLst>
+                                        <p:tav tm="0">
+                                          <p:val>
+                                            <p:strVal val="#ppt_y+.1"/>
+                                          </p:val>
+                                        </p:tav>
+                                        <p:tav tm="100000">
+                                          <p:val>
+                                            <p:strVal val="#ppt_y"/>
+                                          </p:val>
+                                        </p:tav>
+                                      </p:tavLst>
+                                    </p:anim>
+                                  </p:childTnLst>
+                                </p:cTn>
+                              </p:par>
+                            </p:childTnLst>
+                          </p:cTn>
+                        </p:par>
+                        <p:par>
+                          <p:cTn id="16" fill="hold">
+                            <p:stCondLst>
+                              <p:cond delay="2000"/>
+                            </p:stCondLst>
+                            <p:childTnLst>
+                              <p:par>
+                                <p:cTn id="17" presetID="2" presetClass="entr" presetSubtype="2" fill="hold" nodeType="afterEffect">
+                                  <p:stCondLst>
+                                    <p:cond delay="0"/>
+                                  </p:stCondLst>
+                                  <p:childTnLst>
+                                    <p:set>
+                                      <p:cBhvr>
+                                        <p:cTn id="18" dur="1" fill="hold">
+                                          <p:stCondLst>
+                                            <p:cond delay="0"/>
+                                          </p:stCondLst>
+                                        </p:cTn>
+                                        <p:tgtEl>
+                                          <p:spTgt spid="3"/>
+                                        </p:tgtEl>
+                                        <p:attrNameLst>
+                                          <p:attrName>style.visibility</p:attrName>
+                                        </p:attrNameLst>
+                                      </p:cBhvr>
+                                      <p:to>
+                                        <p:strVal val="visible"/>
+                                      </p:to>
+                                    </p:set>
+                                    <p:anim calcmode="lin" valueType="num">
+                                      <p:cBhvr additive="base">
+                                        <p:cTn id="19" dur="1000" fill="hold"/>
+                                        <p:tgtEl>
+                                          <p:spTgt spid="3"/>
+                                        </p:tgtEl>
+                                        <p:attrNameLst>
+                                          <p:attrName>ppt_x</p:attrName>
+                                        </p:attrNameLst>
+                                      </p:cBhvr>
+                                      <p:tavLst>
+                                        <p:tav tm="0">
+                                          <p:val>
+                                            <p:strVal val="1+#ppt_w/2"/>
+                                          </p:val>
+                                        </p:tav>
+                                        <p:tav tm="100000">
+                                          <p:val>
+                                            <p:strVal val="#ppt_x"/>
+                                          </p:val>
+                                        </p:tav>
+                                      </p:tavLst>
+                                    </p:anim>
+                                    <p:anim calcmode="lin" valueType="num">
+                                      <p:cBhvr additive="base">
+                                        <p:cTn id="20" dur="1000" fill="hold"/>
+                                        <p:tgtEl>
+                                          <p:spTgt spid="3"/>
+                                        </p:tgtEl>
+                                        <p:attrNameLst>
+                                          <p:attrName>ppt_y</p:attrName>
+                                        </p:attrNameLst>
+                                      </p:cBhvr>
+                                      <p:tavLst>
+                                        <p:tav tm="0">
+                                          <p:val>
+                                            <p:strVal val="#ppt_y"/>
+                                          </p:val>
+                                        </p:tav>
+                                        <p:tav tm="100000">
+                                          <p:val>
+                                            <p:strVal val="#ppt_y"/>
+                                          </p:val>
+                                        </p:tav>
+                                      </p:tavLst>
+                                    </p:anim>
+                                  </p:childTnLst>
+                                </p:cTn>
+                              </p:par>
+                            </p:childTnLst>
+                          </p:cTn>
+                        </p:par>
+                      </p:childTnLst>
+                    </p:cTn>
+                  </p:par>
+                </p:childTnLst>
+              </p:cTn>
+              <p:prevCondLst>
+                <p:cond evt="onPrev" delay="0">
+                  <p:tgtEl>
+                    <p:sldTgt/>
+                  </p:tgtEl>
+                </p:cond>
+              </p:prevCondLst>
+              <p:nextCondLst>
+                <p:cond evt="onNext" delay="0">
+                  <p:tgtEl>
+                    <p:sldTgt/>
+                  </p:tgtEl>
+                </p:cond>
+              </p:nextCondLst>
+            </p:seq>
+          </p:childTnLst>
+        </p:cTn>
+      </p:par>
+    </p:tnLst>
+    <p:bldLst>
+      <p:bldP spid="4" grpId="0"/>
+      <p:bldP spid="5" grpId="0"/>
+    </p:bldLst>
+  </p:timing>
 </p:sld>
 </file>
 
@@ -6880,6 +7574,322 @@
   <p:transition spd="slow">
     <p:cover/>
   </p:transition>
+  <p:timing>
+    <p:tnLst>
+      <p:par>
+        <p:cTn id="1" dur="indefinite" restart="never" nodeType="tmRoot">
+          <p:childTnLst>
+            <p:seq concurrent="1" nextAc="seek">
+              <p:cTn id="2" dur="indefinite" nodeType="mainSeq">
+                <p:childTnLst>
+                  <p:par>
+                    <p:cTn id="3" fill="hold">
+                      <p:stCondLst>
+                        <p:cond delay="indefinite"/>
+                        <p:cond evt="onBegin" delay="0">
+                          <p:tn val="2"/>
+                        </p:cond>
+                      </p:stCondLst>
+                      <p:childTnLst>
+                        <p:par>
+                          <p:cTn id="4" fill="hold">
+                            <p:stCondLst>
+                              <p:cond delay="0"/>
+                            </p:stCondLst>
+                            <p:childTnLst>
+                              <p:par>
+                                <p:cTn id="5" presetID="42" presetClass="entr" presetSubtype="0" fill="hold" grpId="0" nodeType="afterEffect">
+                                  <p:stCondLst>
+                                    <p:cond delay="0"/>
+                                  </p:stCondLst>
+                                  <p:childTnLst>
+                                    <p:set>
+                                      <p:cBhvr>
+                                        <p:cTn id="6" dur="1" fill="hold">
+                                          <p:stCondLst>
+                                            <p:cond delay="0"/>
+                                          </p:stCondLst>
+                                        </p:cTn>
+                                        <p:tgtEl>
+                                          <p:spTgt spid="4"/>
+                                        </p:tgtEl>
+                                        <p:attrNameLst>
+                                          <p:attrName>style.visibility</p:attrName>
+                                        </p:attrNameLst>
+                                      </p:cBhvr>
+                                      <p:to>
+                                        <p:strVal val="visible"/>
+                                      </p:to>
+                                    </p:set>
+                                    <p:animEffect transition="in" filter="fade">
+                                      <p:cBhvr>
+                                        <p:cTn id="7" dur="1000"/>
+                                        <p:tgtEl>
+                                          <p:spTgt spid="4"/>
+                                        </p:tgtEl>
+                                      </p:cBhvr>
+                                    </p:animEffect>
+                                    <p:anim calcmode="lin" valueType="num">
+                                      <p:cBhvr>
+                                        <p:cTn id="8" dur="1000" fill="hold"/>
+                                        <p:tgtEl>
+                                          <p:spTgt spid="4"/>
+                                        </p:tgtEl>
+                                        <p:attrNameLst>
+                                          <p:attrName>ppt_x</p:attrName>
+                                        </p:attrNameLst>
+                                      </p:cBhvr>
+                                      <p:tavLst>
+                                        <p:tav tm="0">
+                                          <p:val>
+                                            <p:strVal val="#ppt_x"/>
+                                          </p:val>
+                                        </p:tav>
+                                        <p:tav tm="100000">
+                                          <p:val>
+                                            <p:strVal val="#ppt_x"/>
+                                          </p:val>
+                                        </p:tav>
+                                      </p:tavLst>
+                                    </p:anim>
+                                    <p:anim calcmode="lin" valueType="num">
+                                      <p:cBhvr>
+                                        <p:cTn id="9" dur="1000" fill="hold"/>
+                                        <p:tgtEl>
+                                          <p:spTgt spid="4"/>
+                                        </p:tgtEl>
+                                        <p:attrNameLst>
+                                          <p:attrName>ppt_y</p:attrName>
+                                        </p:attrNameLst>
+                                      </p:cBhvr>
+                                      <p:tavLst>
+                                        <p:tav tm="0">
+                                          <p:val>
+                                            <p:strVal val="#ppt_y+.1"/>
+                                          </p:val>
+                                        </p:tav>
+                                        <p:tav tm="100000">
+                                          <p:val>
+                                            <p:strVal val="#ppt_y"/>
+                                          </p:val>
+                                        </p:tav>
+                                      </p:tavLst>
+                                    </p:anim>
+                                  </p:childTnLst>
+                                </p:cTn>
+                              </p:par>
+                            </p:childTnLst>
+                          </p:cTn>
+                        </p:par>
+                        <p:par>
+                          <p:cTn id="10" fill="hold">
+                            <p:stCondLst>
+                              <p:cond delay="1000"/>
+                            </p:stCondLst>
+                            <p:childTnLst>
+                              <p:par>
+                                <p:cTn id="11" presetID="42" presetClass="entr" presetSubtype="0" fill="hold" grpId="0" nodeType="afterEffect">
+                                  <p:stCondLst>
+                                    <p:cond delay="0"/>
+                                  </p:stCondLst>
+                                  <p:childTnLst>
+                                    <p:set>
+                                      <p:cBhvr>
+                                        <p:cTn id="12" dur="1" fill="hold">
+                                          <p:stCondLst>
+                                            <p:cond delay="0"/>
+                                          </p:stCondLst>
+                                        </p:cTn>
+                                        <p:tgtEl>
+                                          <p:spTgt spid="5"/>
+                                        </p:tgtEl>
+                                        <p:attrNameLst>
+                                          <p:attrName>style.visibility</p:attrName>
+                                        </p:attrNameLst>
+                                      </p:cBhvr>
+                                      <p:to>
+                                        <p:strVal val="visible"/>
+                                      </p:to>
+                                    </p:set>
+                                    <p:animEffect transition="in" filter="fade">
+                                      <p:cBhvr>
+                                        <p:cTn id="13" dur="1000"/>
+                                        <p:tgtEl>
+                                          <p:spTgt spid="5"/>
+                                        </p:tgtEl>
+                                      </p:cBhvr>
+                                    </p:animEffect>
+                                    <p:anim calcmode="lin" valueType="num">
+                                      <p:cBhvr>
+                                        <p:cTn id="14" dur="1000" fill="hold"/>
+                                        <p:tgtEl>
+                                          <p:spTgt spid="5"/>
+                                        </p:tgtEl>
+                                        <p:attrNameLst>
+                                          <p:attrName>ppt_x</p:attrName>
+                                        </p:attrNameLst>
+                                      </p:cBhvr>
+                                      <p:tavLst>
+                                        <p:tav tm="0">
+                                          <p:val>
+                                            <p:strVal val="#ppt_x"/>
+                                          </p:val>
+                                        </p:tav>
+                                        <p:tav tm="100000">
+                                          <p:val>
+                                            <p:strVal val="#ppt_x"/>
+                                          </p:val>
+                                        </p:tav>
+                                      </p:tavLst>
+                                    </p:anim>
+                                    <p:anim calcmode="lin" valueType="num">
+                                      <p:cBhvr>
+                                        <p:cTn id="15" dur="1000" fill="hold"/>
+                                        <p:tgtEl>
+                                          <p:spTgt spid="5"/>
+                                        </p:tgtEl>
+                                        <p:attrNameLst>
+                                          <p:attrName>ppt_y</p:attrName>
+                                        </p:attrNameLst>
+                                      </p:cBhvr>
+                                      <p:tavLst>
+                                        <p:tav tm="0">
+                                          <p:val>
+                                            <p:strVal val="#ppt_y+.1"/>
+                                          </p:val>
+                                        </p:tav>
+                                        <p:tav tm="100000">
+                                          <p:val>
+                                            <p:strVal val="#ppt_y"/>
+                                          </p:val>
+                                        </p:tav>
+                                      </p:tavLst>
+                                    </p:anim>
+                                  </p:childTnLst>
+                                </p:cTn>
+                              </p:par>
+                            </p:childTnLst>
+                          </p:cTn>
+                        </p:par>
+                        <p:par>
+                          <p:cTn id="16" fill="hold">
+                            <p:stCondLst>
+                              <p:cond delay="2000"/>
+                            </p:stCondLst>
+                            <p:childTnLst>
+                              <p:par>
+                                <p:cTn id="17" presetID="42" presetClass="entr" presetSubtype="0" fill="hold" nodeType="afterEffect">
+                                  <p:stCondLst>
+                                    <p:cond delay="0"/>
+                                  </p:stCondLst>
+                                  <p:childTnLst>
+                                    <p:set>
+                                      <p:cBhvr>
+                                        <p:cTn id="18" dur="1" fill="hold">
+                                          <p:stCondLst>
+                                            <p:cond delay="0"/>
+                                          </p:stCondLst>
+                                        </p:cTn>
+                                        <p:tgtEl>
+                                          <p:spTgt spid="3"/>
+                                        </p:tgtEl>
+                                        <p:attrNameLst>
+                                          <p:attrName>style.visibility</p:attrName>
+                                        </p:attrNameLst>
+                                      </p:cBhvr>
+                                      <p:to>
+                                        <p:strVal val="visible"/>
+                                      </p:to>
+                                    </p:set>
+                                    <p:animEffect transition="in" filter="fade">
+                                      <p:cBhvr>
+                                        <p:cTn id="19" dur="1000"/>
+                                        <p:tgtEl>
+                                          <p:spTgt spid="3"/>
+                                        </p:tgtEl>
+                                      </p:cBhvr>
+                                    </p:animEffect>
+                                    <p:anim calcmode="lin" valueType="num">
+                                      <p:cBhvr>
+                                        <p:cTn id="20" dur="1000" fill="hold"/>
+                                        <p:tgtEl>
+                                          <p:spTgt spid="3"/>
+                                        </p:tgtEl>
+                                        <p:attrNameLst>
+                                          <p:attrName>ppt_x</p:attrName>
+                                        </p:attrNameLst>
+                                      </p:cBhvr>
+                                      <p:tavLst>
+                                        <p:tav tm="0">
+                                          <p:val>
+                                            <p:strVal val="#ppt_x"/>
+                                          </p:val>
+                                        </p:tav>
+                                        <p:tav tm="100000">
+                                          <p:val>
+                                            <p:strVal val="#ppt_x"/>
+                                          </p:val>
+                                        </p:tav>
+                                      </p:tavLst>
+                                    </p:anim>
+                                    <p:anim calcmode="lin" valueType="num">
+                                      <p:cBhvr>
+                                        <p:cTn id="21" dur="1000" fill="hold"/>
+                                        <p:tgtEl>
+                                          <p:spTgt spid="3"/>
+                                        </p:tgtEl>
+                                        <p:attrNameLst>
+                                          <p:attrName>ppt_y</p:attrName>
+                                        </p:attrNameLst>
+                                      </p:cBhvr>
+                                      <p:tavLst>
+                                        <p:tav tm="0">
+                                          <p:val>
+                                            <p:strVal val="#ppt_y+.1"/>
+                                          </p:val>
+                                        </p:tav>
+                                        <p:tav tm="100000">
+                                          <p:val>
+                                            <p:strVal val="#ppt_y"/>
+                                          </p:val>
+                                        </p:tav>
+                                      </p:tavLst>
+                                    </p:anim>
+                                  </p:childTnLst>
+                                </p:cTn>
+                              </p:par>
+                            </p:childTnLst>
+                          </p:cTn>
+                        </p:par>
+                      </p:childTnLst>
+                    </p:cTn>
+                  </p:par>
+                </p:childTnLst>
+              </p:cTn>
+              <p:prevCondLst>
+                <p:cond evt="onPrev" delay="0">
+                  <p:tgtEl>
+                    <p:sldTgt/>
+                  </p:tgtEl>
+                </p:cond>
+              </p:prevCondLst>
+              <p:nextCondLst>
+                <p:cond evt="onNext" delay="0">
+                  <p:tgtEl>
+                    <p:sldTgt/>
+                  </p:tgtEl>
+                </p:cond>
+              </p:nextCondLst>
+            </p:seq>
+          </p:childTnLst>
+        </p:cTn>
+      </p:par>
+    </p:tnLst>
+    <p:bldLst>
+      <p:bldP spid="4" grpId="0"/>
+      <p:bldP spid="5" grpId="0"/>
+    </p:bldLst>
+  </p:timing>
 </p:sld>
 </file>
 
@@ -7176,6 +8186,314 @@
   <p:transition spd="slow">
     <p:cover/>
   </p:transition>
+  <p:timing>
+    <p:tnLst>
+      <p:par>
+        <p:cTn id="1" dur="indefinite" restart="never" nodeType="tmRoot">
+          <p:childTnLst>
+            <p:seq concurrent="1" nextAc="seek">
+              <p:cTn id="2" dur="indefinite" nodeType="mainSeq">
+                <p:childTnLst>
+                  <p:par>
+                    <p:cTn id="3" fill="hold">
+                      <p:stCondLst>
+                        <p:cond delay="indefinite"/>
+                        <p:cond evt="onBegin" delay="0">
+                          <p:tn val="2"/>
+                        </p:cond>
+                      </p:stCondLst>
+                      <p:childTnLst>
+                        <p:par>
+                          <p:cTn id="4" fill="hold">
+                            <p:stCondLst>
+                              <p:cond delay="0"/>
+                            </p:stCondLst>
+                            <p:childTnLst>
+                              <p:par>
+                                <p:cTn id="5" presetID="47" presetClass="entr" presetSubtype="0" fill="hold" grpId="0" nodeType="afterEffect">
+                                  <p:stCondLst>
+                                    <p:cond delay="0"/>
+                                  </p:stCondLst>
+                                  <p:childTnLst>
+                                    <p:set>
+                                      <p:cBhvr>
+                                        <p:cTn id="6" dur="1" fill="hold">
+                                          <p:stCondLst>
+                                            <p:cond delay="0"/>
+                                          </p:stCondLst>
+                                        </p:cTn>
+                                        <p:tgtEl>
+                                          <p:spTgt spid="2"/>
+                                        </p:tgtEl>
+                                        <p:attrNameLst>
+                                          <p:attrName>style.visibility</p:attrName>
+                                        </p:attrNameLst>
+                                      </p:cBhvr>
+                                      <p:to>
+                                        <p:strVal val="visible"/>
+                                      </p:to>
+                                    </p:set>
+                                    <p:animEffect transition="in" filter="fade">
+                                      <p:cBhvr>
+                                        <p:cTn id="7" dur="1000"/>
+                                        <p:tgtEl>
+                                          <p:spTgt spid="2"/>
+                                        </p:tgtEl>
+                                      </p:cBhvr>
+                                    </p:animEffect>
+                                    <p:anim calcmode="lin" valueType="num">
+                                      <p:cBhvr>
+                                        <p:cTn id="8" dur="1000" fill="hold"/>
+                                        <p:tgtEl>
+                                          <p:spTgt spid="2"/>
+                                        </p:tgtEl>
+                                        <p:attrNameLst>
+                                          <p:attrName>ppt_x</p:attrName>
+                                        </p:attrNameLst>
+                                      </p:cBhvr>
+                                      <p:tavLst>
+                                        <p:tav tm="0">
+                                          <p:val>
+                                            <p:strVal val="#ppt_x"/>
+                                          </p:val>
+                                        </p:tav>
+                                        <p:tav tm="100000">
+                                          <p:val>
+                                            <p:strVal val="#ppt_x"/>
+                                          </p:val>
+                                        </p:tav>
+                                      </p:tavLst>
+                                    </p:anim>
+                                    <p:anim calcmode="lin" valueType="num">
+                                      <p:cBhvr>
+                                        <p:cTn id="9" dur="1000" fill="hold"/>
+                                        <p:tgtEl>
+                                          <p:spTgt spid="2"/>
+                                        </p:tgtEl>
+                                        <p:attrNameLst>
+                                          <p:attrName>ppt_y</p:attrName>
+                                        </p:attrNameLst>
+                                      </p:cBhvr>
+                                      <p:tavLst>
+                                        <p:tav tm="0">
+                                          <p:val>
+                                            <p:strVal val="#ppt_y-.1"/>
+                                          </p:val>
+                                        </p:tav>
+                                        <p:tav tm="100000">
+                                          <p:val>
+                                            <p:strVal val="#ppt_y"/>
+                                          </p:val>
+                                        </p:tav>
+                                      </p:tavLst>
+                                    </p:anim>
+                                  </p:childTnLst>
+                                </p:cTn>
+                              </p:par>
+                            </p:childTnLst>
+                          </p:cTn>
+                        </p:par>
+                        <p:par>
+                          <p:cTn id="10" fill="hold">
+                            <p:stCondLst>
+                              <p:cond delay="1000"/>
+                            </p:stCondLst>
+                            <p:childTnLst>
+                              <p:par>
+                                <p:cTn id="11" presetID="42" presetClass="entr" presetSubtype="0" fill="hold" grpId="0" nodeType="afterEffect">
+                                  <p:stCondLst>
+                                    <p:cond delay="0"/>
+                                  </p:stCondLst>
+                                  <p:childTnLst>
+                                    <p:set>
+                                      <p:cBhvr>
+                                        <p:cTn id="12" dur="1" fill="hold">
+                                          <p:stCondLst>
+                                            <p:cond delay="0"/>
+                                          </p:stCondLst>
+                                        </p:cTn>
+                                        <p:tgtEl>
+                                          <p:spTgt spid="3"/>
+                                        </p:tgtEl>
+                                        <p:attrNameLst>
+                                          <p:attrName>style.visibility</p:attrName>
+                                        </p:attrNameLst>
+                                      </p:cBhvr>
+                                      <p:to>
+                                        <p:strVal val="visible"/>
+                                      </p:to>
+                                    </p:set>
+                                    <p:animEffect transition="in" filter="fade">
+                                      <p:cBhvr>
+                                        <p:cTn id="13" dur="1000"/>
+                                        <p:tgtEl>
+                                          <p:spTgt spid="3"/>
+                                        </p:tgtEl>
+                                      </p:cBhvr>
+                                    </p:animEffect>
+                                    <p:anim calcmode="lin" valueType="num">
+                                      <p:cBhvr>
+                                        <p:cTn id="14" dur="1000" fill="hold"/>
+                                        <p:tgtEl>
+                                          <p:spTgt spid="3"/>
+                                        </p:tgtEl>
+                                        <p:attrNameLst>
+                                          <p:attrName>ppt_x</p:attrName>
+                                        </p:attrNameLst>
+                                      </p:cBhvr>
+                                      <p:tavLst>
+                                        <p:tav tm="0">
+                                          <p:val>
+                                            <p:strVal val="#ppt_x"/>
+                                          </p:val>
+                                        </p:tav>
+                                        <p:tav tm="100000">
+                                          <p:val>
+                                            <p:strVal val="#ppt_x"/>
+                                          </p:val>
+                                        </p:tav>
+                                      </p:tavLst>
+                                    </p:anim>
+                                    <p:anim calcmode="lin" valueType="num">
+                                      <p:cBhvr>
+                                        <p:cTn id="15" dur="1000" fill="hold"/>
+                                        <p:tgtEl>
+                                          <p:spTgt spid="3"/>
+                                        </p:tgtEl>
+                                        <p:attrNameLst>
+                                          <p:attrName>ppt_y</p:attrName>
+                                        </p:attrNameLst>
+                                      </p:cBhvr>
+                                      <p:tavLst>
+                                        <p:tav tm="0">
+                                          <p:val>
+                                            <p:strVal val="#ppt_y+.1"/>
+                                          </p:val>
+                                        </p:tav>
+                                        <p:tav tm="100000">
+                                          <p:val>
+                                            <p:strVal val="#ppt_y"/>
+                                          </p:val>
+                                        </p:tav>
+                                      </p:tavLst>
+                                    </p:anim>
+                                  </p:childTnLst>
+                                </p:cTn>
+                              </p:par>
+                            </p:childTnLst>
+                          </p:cTn>
+                        </p:par>
+                        <p:par>
+                          <p:cTn id="16" fill="hold">
+                            <p:stCondLst>
+                              <p:cond delay="2000"/>
+                            </p:stCondLst>
+                            <p:childTnLst>
+                              <p:par>
+                                <p:cTn id="17" presetID="2" presetClass="entr" presetSubtype="2" fill="hold" nodeType="afterEffect">
+                                  <p:stCondLst>
+                                    <p:cond delay="0"/>
+                                  </p:stCondLst>
+                                  <p:childTnLst>
+                                    <p:set>
+                                      <p:cBhvr>
+                                        <p:cTn id="18" dur="1" fill="hold">
+                                          <p:stCondLst>
+                                            <p:cond delay="0"/>
+                                          </p:stCondLst>
+                                        </p:cTn>
+                                        <p:tgtEl>
+                                          <p:spTgt spid="5"/>
+                                        </p:tgtEl>
+                                        <p:attrNameLst>
+                                          <p:attrName>style.visibility</p:attrName>
+                                        </p:attrNameLst>
+                                      </p:cBhvr>
+                                      <p:to>
+                                        <p:strVal val="visible"/>
+                                      </p:to>
+                                    </p:set>
+                                    <p:anim calcmode="lin" valueType="num">
+                                      <p:cBhvr additive="base">
+                                        <p:cTn id="19" dur="1000" fill="hold"/>
+                                        <p:tgtEl>
+                                          <p:spTgt spid="5"/>
+                                        </p:tgtEl>
+                                        <p:attrNameLst>
+                                          <p:attrName>ppt_x</p:attrName>
+                                        </p:attrNameLst>
+                                      </p:cBhvr>
+                                      <p:tavLst>
+                                        <p:tav tm="0">
+                                          <p:val>
+                                            <p:strVal val="1+#ppt_w/2"/>
+                                          </p:val>
+                                        </p:tav>
+                                        <p:tav tm="100000">
+                                          <p:val>
+                                            <p:strVal val="#ppt_x"/>
+                                          </p:val>
+                                        </p:tav>
+                                      </p:tavLst>
+                                    </p:anim>
+                                    <p:anim calcmode="lin" valueType="num">
+                                      <p:cBhvr additive="base">
+                                        <p:cTn id="20" dur="1000" fill="hold"/>
+                                        <p:tgtEl>
+                                          <p:spTgt spid="5"/>
+                                        </p:tgtEl>
+                                        <p:attrNameLst>
+                                          <p:attrName>ppt_y</p:attrName>
+                                        </p:attrNameLst>
+                                      </p:cBhvr>
+                                      <p:tavLst>
+                                        <p:tav tm="0">
+                                          <p:val>
+                                            <p:strVal val="#ppt_y"/>
+                                          </p:val>
+                                        </p:tav>
+                                        <p:tav tm="100000">
+                                          <p:val>
+                                            <p:strVal val="#ppt_y"/>
+                                          </p:val>
+                                        </p:tav>
+                                      </p:tavLst>
+                                    </p:anim>
+                                  </p:childTnLst>
+                                </p:cTn>
+                              </p:par>
+                            </p:childTnLst>
+                          </p:cTn>
+                        </p:par>
+                      </p:childTnLst>
+                    </p:cTn>
+                  </p:par>
+                </p:childTnLst>
+              </p:cTn>
+              <p:prevCondLst>
+                <p:cond evt="onPrev" delay="0">
+                  <p:tgtEl>
+                    <p:sldTgt/>
+                  </p:tgtEl>
+                </p:cond>
+              </p:prevCondLst>
+              <p:nextCondLst>
+                <p:cond evt="onNext" delay="0">
+                  <p:tgtEl>
+                    <p:sldTgt/>
+                  </p:tgtEl>
+                </p:cond>
+              </p:nextCondLst>
+            </p:seq>
+          </p:childTnLst>
+        </p:cTn>
+      </p:par>
+    </p:tnLst>
+    <p:bldLst>
+      <p:bldP spid="2" grpId="0"/>
+      <p:bldP spid="3" grpId="0"/>
+    </p:bldLst>
+  </p:timing>
 </p:sld>
 </file>
 
@@ -7380,6 +8698,314 @@
   <p:transition spd="slow">
     <p:cover/>
   </p:transition>
+  <p:timing>
+    <p:tnLst>
+      <p:par>
+        <p:cTn id="1" dur="indefinite" restart="never" nodeType="tmRoot">
+          <p:childTnLst>
+            <p:seq concurrent="1" nextAc="seek">
+              <p:cTn id="2" dur="indefinite" nodeType="mainSeq">
+                <p:childTnLst>
+                  <p:par>
+                    <p:cTn id="3" fill="hold">
+                      <p:stCondLst>
+                        <p:cond delay="indefinite"/>
+                        <p:cond evt="onBegin" delay="0">
+                          <p:tn val="2"/>
+                        </p:cond>
+                      </p:stCondLst>
+                      <p:childTnLst>
+                        <p:par>
+                          <p:cTn id="4" fill="hold">
+                            <p:stCondLst>
+                              <p:cond delay="0"/>
+                            </p:stCondLst>
+                            <p:childTnLst>
+                              <p:par>
+                                <p:cTn id="5" presetID="47" presetClass="entr" presetSubtype="0" fill="hold" grpId="0" nodeType="afterEffect">
+                                  <p:stCondLst>
+                                    <p:cond delay="0"/>
+                                  </p:stCondLst>
+                                  <p:childTnLst>
+                                    <p:set>
+                                      <p:cBhvr>
+                                        <p:cTn id="6" dur="1" fill="hold">
+                                          <p:stCondLst>
+                                            <p:cond delay="0"/>
+                                          </p:stCondLst>
+                                        </p:cTn>
+                                        <p:tgtEl>
+                                          <p:spTgt spid="4"/>
+                                        </p:tgtEl>
+                                        <p:attrNameLst>
+                                          <p:attrName>style.visibility</p:attrName>
+                                        </p:attrNameLst>
+                                      </p:cBhvr>
+                                      <p:to>
+                                        <p:strVal val="visible"/>
+                                      </p:to>
+                                    </p:set>
+                                    <p:animEffect transition="in" filter="fade">
+                                      <p:cBhvr>
+                                        <p:cTn id="7" dur="1000"/>
+                                        <p:tgtEl>
+                                          <p:spTgt spid="4"/>
+                                        </p:tgtEl>
+                                      </p:cBhvr>
+                                    </p:animEffect>
+                                    <p:anim calcmode="lin" valueType="num">
+                                      <p:cBhvr>
+                                        <p:cTn id="8" dur="1000" fill="hold"/>
+                                        <p:tgtEl>
+                                          <p:spTgt spid="4"/>
+                                        </p:tgtEl>
+                                        <p:attrNameLst>
+                                          <p:attrName>ppt_x</p:attrName>
+                                        </p:attrNameLst>
+                                      </p:cBhvr>
+                                      <p:tavLst>
+                                        <p:tav tm="0">
+                                          <p:val>
+                                            <p:strVal val="#ppt_x"/>
+                                          </p:val>
+                                        </p:tav>
+                                        <p:tav tm="100000">
+                                          <p:val>
+                                            <p:strVal val="#ppt_x"/>
+                                          </p:val>
+                                        </p:tav>
+                                      </p:tavLst>
+                                    </p:anim>
+                                    <p:anim calcmode="lin" valueType="num">
+                                      <p:cBhvr>
+                                        <p:cTn id="9" dur="1000" fill="hold"/>
+                                        <p:tgtEl>
+                                          <p:spTgt spid="4"/>
+                                        </p:tgtEl>
+                                        <p:attrNameLst>
+                                          <p:attrName>ppt_y</p:attrName>
+                                        </p:attrNameLst>
+                                      </p:cBhvr>
+                                      <p:tavLst>
+                                        <p:tav tm="0">
+                                          <p:val>
+                                            <p:strVal val="#ppt_y-.1"/>
+                                          </p:val>
+                                        </p:tav>
+                                        <p:tav tm="100000">
+                                          <p:val>
+                                            <p:strVal val="#ppt_y"/>
+                                          </p:val>
+                                        </p:tav>
+                                      </p:tavLst>
+                                    </p:anim>
+                                  </p:childTnLst>
+                                </p:cTn>
+                              </p:par>
+                            </p:childTnLst>
+                          </p:cTn>
+                        </p:par>
+                        <p:par>
+                          <p:cTn id="10" fill="hold">
+                            <p:stCondLst>
+                              <p:cond delay="1000"/>
+                            </p:stCondLst>
+                            <p:childTnLst>
+                              <p:par>
+                                <p:cTn id="11" presetID="42" presetClass="entr" presetSubtype="0" fill="hold" grpId="0" nodeType="afterEffect">
+                                  <p:stCondLst>
+                                    <p:cond delay="0"/>
+                                  </p:stCondLst>
+                                  <p:childTnLst>
+                                    <p:set>
+                                      <p:cBhvr>
+                                        <p:cTn id="12" dur="1" fill="hold">
+                                          <p:stCondLst>
+                                            <p:cond delay="0"/>
+                                          </p:stCondLst>
+                                        </p:cTn>
+                                        <p:tgtEl>
+                                          <p:spTgt spid="5"/>
+                                        </p:tgtEl>
+                                        <p:attrNameLst>
+                                          <p:attrName>style.visibility</p:attrName>
+                                        </p:attrNameLst>
+                                      </p:cBhvr>
+                                      <p:to>
+                                        <p:strVal val="visible"/>
+                                      </p:to>
+                                    </p:set>
+                                    <p:animEffect transition="in" filter="fade">
+                                      <p:cBhvr>
+                                        <p:cTn id="13" dur="1000"/>
+                                        <p:tgtEl>
+                                          <p:spTgt spid="5"/>
+                                        </p:tgtEl>
+                                      </p:cBhvr>
+                                    </p:animEffect>
+                                    <p:anim calcmode="lin" valueType="num">
+                                      <p:cBhvr>
+                                        <p:cTn id="14" dur="1000" fill="hold"/>
+                                        <p:tgtEl>
+                                          <p:spTgt spid="5"/>
+                                        </p:tgtEl>
+                                        <p:attrNameLst>
+                                          <p:attrName>ppt_x</p:attrName>
+                                        </p:attrNameLst>
+                                      </p:cBhvr>
+                                      <p:tavLst>
+                                        <p:tav tm="0">
+                                          <p:val>
+                                            <p:strVal val="#ppt_x"/>
+                                          </p:val>
+                                        </p:tav>
+                                        <p:tav tm="100000">
+                                          <p:val>
+                                            <p:strVal val="#ppt_x"/>
+                                          </p:val>
+                                        </p:tav>
+                                      </p:tavLst>
+                                    </p:anim>
+                                    <p:anim calcmode="lin" valueType="num">
+                                      <p:cBhvr>
+                                        <p:cTn id="15" dur="1000" fill="hold"/>
+                                        <p:tgtEl>
+                                          <p:spTgt spid="5"/>
+                                        </p:tgtEl>
+                                        <p:attrNameLst>
+                                          <p:attrName>ppt_y</p:attrName>
+                                        </p:attrNameLst>
+                                      </p:cBhvr>
+                                      <p:tavLst>
+                                        <p:tav tm="0">
+                                          <p:val>
+                                            <p:strVal val="#ppt_y+.1"/>
+                                          </p:val>
+                                        </p:tav>
+                                        <p:tav tm="100000">
+                                          <p:val>
+                                            <p:strVal val="#ppt_y"/>
+                                          </p:val>
+                                        </p:tav>
+                                      </p:tavLst>
+                                    </p:anim>
+                                  </p:childTnLst>
+                                </p:cTn>
+                              </p:par>
+                            </p:childTnLst>
+                          </p:cTn>
+                        </p:par>
+                        <p:par>
+                          <p:cTn id="16" fill="hold">
+                            <p:stCondLst>
+                              <p:cond delay="2000"/>
+                            </p:stCondLst>
+                            <p:childTnLst>
+                              <p:par>
+                                <p:cTn id="17" presetID="2" presetClass="entr" presetSubtype="2" fill="hold" nodeType="afterEffect">
+                                  <p:stCondLst>
+                                    <p:cond delay="0"/>
+                                  </p:stCondLst>
+                                  <p:childTnLst>
+                                    <p:set>
+                                      <p:cBhvr>
+                                        <p:cTn id="18" dur="1" fill="hold">
+                                          <p:stCondLst>
+                                            <p:cond delay="0"/>
+                                          </p:stCondLst>
+                                        </p:cTn>
+                                        <p:tgtEl>
+                                          <p:spTgt spid="3"/>
+                                        </p:tgtEl>
+                                        <p:attrNameLst>
+                                          <p:attrName>style.visibility</p:attrName>
+                                        </p:attrNameLst>
+                                      </p:cBhvr>
+                                      <p:to>
+                                        <p:strVal val="visible"/>
+                                      </p:to>
+                                    </p:set>
+                                    <p:anim calcmode="lin" valueType="num">
+                                      <p:cBhvr additive="base">
+                                        <p:cTn id="19" dur="1000" fill="hold"/>
+                                        <p:tgtEl>
+                                          <p:spTgt spid="3"/>
+                                        </p:tgtEl>
+                                        <p:attrNameLst>
+                                          <p:attrName>ppt_x</p:attrName>
+                                        </p:attrNameLst>
+                                      </p:cBhvr>
+                                      <p:tavLst>
+                                        <p:tav tm="0">
+                                          <p:val>
+                                            <p:strVal val="1+#ppt_w/2"/>
+                                          </p:val>
+                                        </p:tav>
+                                        <p:tav tm="100000">
+                                          <p:val>
+                                            <p:strVal val="#ppt_x"/>
+                                          </p:val>
+                                        </p:tav>
+                                      </p:tavLst>
+                                    </p:anim>
+                                    <p:anim calcmode="lin" valueType="num">
+                                      <p:cBhvr additive="base">
+                                        <p:cTn id="20" dur="1000" fill="hold"/>
+                                        <p:tgtEl>
+                                          <p:spTgt spid="3"/>
+                                        </p:tgtEl>
+                                        <p:attrNameLst>
+                                          <p:attrName>ppt_y</p:attrName>
+                                        </p:attrNameLst>
+                                      </p:cBhvr>
+                                      <p:tavLst>
+                                        <p:tav tm="0">
+                                          <p:val>
+                                            <p:strVal val="#ppt_y"/>
+                                          </p:val>
+                                        </p:tav>
+                                        <p:tav tm="100000">
+                                          <p:val>
+                                            <p:strVal val="#ppt_y"/>
+                                          </p:val>
+                                        </p:tav>
+                                      </p:tavLst>
+                                    </p:anim>
+                                  </p:childTnLst>
+                                </p:cTn>
+                              </p:par>
+                            </p:childTnLst>
+                          </p:cTn>
+                        </p:par>
+                      </p:childTnLst>
+                    </p:cTn>
+                  </p:par>
+                </p:childTnLst>
+              </p:cTn>
+              <p:prevCondLst>
+                <p:cond evt="onPrev" delay="0">
+                  <p:tgtEl>
+                    <p:sldTgt/>
+                  </p:tgtEl>
+                </p:cond>
+              </p:prevCondLst>
+              <p:nextCondLst>
+                <p:cond evt="onNext" delay="0">
+                  <p:tgtEl>
+                    <p:sldTgt/>
+                  </p:tgtEl>
+                </p:cond>
+              </p:nextCondLst>
+            </p:seq>
+          </p:childTnLst>
+        </p:cTn>
+      </p:par>
+    </p:tnLst>
+    <p:bldLst>
+      <p:bldP spid="4" grpId="0"/>
+      <p:bldP spid="5" grpId="0"/>
+    </p:bldLst>
+  </p:timing>
 </p:sld>
 </file>
 

</xml_diff>